<commit_message>
Forstærker + Filter billede
</commit_message>
<xml_diff>
--- a/Bifiler til projekt/Semesterprojekt 3.pptx
+++ b/Bifiler til projekt/Semesterprojekt 3.pptx
@@ -10,8 +10,8 @@
     <p:sldId id="257" r:id="rId4"/>
     <p:sldId id="262" r:id="rId5"/>
     <p:sldId id="261" r:id="rId6"/>
-    <p:sldId id="259" r:id="rId7"/>
-    <p:sldId id="271" r:id="rId8"/>
+    <p:sldId id="271" r:id="rId7"/>
+    <p:sldId id="274" r:id="rId8"/>
     <p:sldId id="266" r:id="rId9"/>
     <p:sldId id="260" r:id="rId10"/>
     <p:sldId id="268" r:id="rId11"/>
@@ -120,7 +120,18 @@
   </p:defaultTextStyle>
   <p:extLst>
     <p:ext uri="{EFAFB233-063F-42B5-8137-9DF3F51BA10A}">
-      <p15:sldGuideLst xmlns="" xmlns:p15="http://schemas.microsoft.com/office/powerpoint/2012/main"/>
+      <p15:sldGuideLst xmlns:p15="http://schemas.microsoft.com/office/powerpoint/2012/main">
+        <p15:guide id="1" orient="horz" pos="2160">
+          <p15:clr>
+            <a:srgbClr val="A4A3A4"/>
+          </p15:clr>
+        </p15:guide>
+        <p15:guide id="2" pos="3840">
+          <p15:clr>
+            <a:srgbClr val="A4A3A4"/>
+          </p15:clr>
+        </p15:guide>
+      </p15:sldGuideLst>
     </p:ext>
   </p:extLst>
 </p:presentation>
@@ -296,7 +307,7 @@
           <a:p>
             <a:fld id="{48A87A34-81AB-432B-8DAE-1953F412C126}" type="datetimeFigureOut">
               <a:rPr lang="en-US" dirty="0"/>
-              <a:t>20/01/16</a:t>
+              <a:t>1/20/2016</a:t>
             </a:fld>
             <a:endParaRPr lang="en-US" dirty="0"/>
           </a:p>
@@ -348,7 +359,7 @@
           <a:p>
             <a:fld id="{6D22F896-40B5-4ADD-8801-0D06FADFA095}" type="slidenum">
               <a:rPr lang="en-US" dirty="0"/>
-              <a:t>‹#›</a:t>
+              <a:t>‹nr.›</a:t>
             </a:fld>
             <a:endParaRPr lang="en-US" dirty="0"/>
           </a:p>
@@ -558,7 +569,7 @@
           <a:p>
             <a:fld id="{48A87A34-81AB-432B-8DAE-1953F412C126}" type="datetimeFigureOut">
               <a:rPr lang="en-US" dirty="0"/>
-              <a:t>20/01/16</a:t>
+              <a:t>1/20/2016</a:t>
             </a:fld>
             <a:endParaRPr lang="en-US" dirty="0"/>
           </a:p>
@@ -600,7 +611,7 @@
           <a:p>
             <a:fld id="{6D22F896-40B5-4ADD-8801-0D06FADFA095}" type="slidenum">
               <a:rPr lang="en-US" dirty="0"/>
-              <a:t>‹#›</a:t>
+              <a:t>‹nr.›</a:t>
             </a:fld>
             <a:endParaRPr lang="en-US" dirty="0"/>
           </a:p>
@@ -785,7 +796,7 @@
             <a:fld id="{48A87A34-81AB-432B-8DAE-1953F412C126}" type="datetimeFigureOut">
               <a:rPr lang="en-US" dirty="0"/>
               <a:pPr/>
-              <a:t>20/01/16</a:t>
+              <a:t>1/20/2016</a:t>
             </a:fld>
             <a:endParaRPr lang="en-US" dirty="0"/>
           </a:p>
@@ -837,7 +848,7 @@
           <a:p>
             <a:fld id="{6D22F896-40B5-4ADD-8801-0D06FADFA095}" type="slidenum">
               <a:rPr lang="en-US" dirty="0"/>
-              <a:t>‹#›</a:t>
+              <a:t>‹nr.›</a:t>
             </a:fld>
             <a:endParaRPr lang="en-US" dirty="0"/>
           </a:p>
@@ -1091,7 +1102,7 @@
             <a:fld id="{48A87A34-81AB-432B-8DAE-1953F412C126}" type="datetimeFigureOut">
               <a:rPr lang="en-US" dirty="0"/>
               <a:pPr/>
-              <a:t>20/01/16</a:t>
+              <a:t>1/20/2016</a:t>
             </a:fld>
             <a:endParaRPr lang="en-US" dirty="0"/>
           </a:p>
@@ -1143,7 +1154,7 @@
           <a:p>
             <a:fld id="{6D22F896-40B5-4ADD-8801-0D06FADFA095}" type="slidenum">
               <a:rPr lang="en-US" dirty="0"/>
-              <a:t>‹#›</a:t>
+              <a:t>‹nr.›</a:t>
             </a:fld>
             <a:endParaRPr lang="en-US" dirty="0"/>
           </a:p>
@@ -1560,7 +1571,7 @@
             <a:fld id="{48A87A34-81AB-432B-8DAE-1953F412C126}" type="datetimeFigureOut">
               <a:rPr lang="en-US" dirty="0"/>
               <a:pPr/>
-              <a:t>20/01/16</a:t>
+              <a:t>1/20/2016</a:t>
             </a:fld>
             <a:endParaRPr lang="en-US" dirty="0"/>
           </a:p>
@@ -1612,7 +1623,7 @@
           <a:p>
             <a:fld id="{6D22F896-40B5-4ADD-8801-0D06FADFA095}" type="slidenum">
               <a:rPr lang="en-US" dirty="0"/>
-              <a:t>‹#›</a:t>
+              <a:t>‹nr.›</a:t>
             </a:fld>
             <a:endParaRPr lang="en-US" dirty="0"/>
           </a:p>
@@ -2102,7 +2113,7 @@
           <a:p>
             <a:fld id="{48A87A34-81AB-432B-8DAE-1953F412C126}" type="datetimeFigureOut">
               <a:rPr lang="en-US" dirty="0"/>
-              <a:t>20/01/16</a:t>
+              <a:t>1/20/2016</a:t>
             </a:fld>
             <a:endParaRPr lang="en-US" dirty="0"/>
           </a:p>
@@ -2144,7 +2155,7 @@
           <a:p>
             <a:fld id="{6D22F896-40B5-4ADD-8801-0D06FADFA095}" type="slidenum">
               <a:rPr lang="en-US" dirty="0"/>
-              <a:t>‹#›</a:t>
+              <a:t>‹nr.›</a:t>
             </a:fld>
             <a:endParaRPr lang="en-US" dirty="0"/>
           </a:p>
@@ -2871,7 +2882,7 @@
           <a:p>
             <a:fld id="{48A87A34-81AB-432B-8DAE-1953F412C126}" type="datetimeFigureOut">
               <a:rPr lang="en-US" dirty="0"/>
-              <a:t>20/01/16</a:t>
+              <a:t>1/20/2016</a:t>
             </a:fld>
             <a:endParaRPr lang="en-US" dirty="0"/>
           </a:p>
@@ -2913,7 +2924,7 @@
           <a:p>
             <a:fld id="{6D22F896-40B5-4ADD-8801-0D06FADFA095}" type="slidenum">
               <a:rPr lang="en-US" dirty="0"/>
-              <a:t>‹#›</a:t>
+              <a:t>‹nr.›</a:t>
             </a:fld>
             <a:endParaRPr lang="en-US" dirty="0"/>
           </a:p>
@@ -3041,7 +3052,7 @@
           <a:p>
             <a:fld id="{48A87A34-81AB-432B-8DAE-1953F412C126}" type="datetimeFigureOut">
               <a:rPr lang="en-US" dirty="0"/>
-              <a:t>20/01/16</a:t>
+              <a:t>1/20/2016</a:t>
             </a:fld>
             <a:endParaRPr lang="en-US" dirty="0"/>
           </a:p>
@@ -3083,7 +3094,7 @@
           <a:p>
             <a:fld id="{6D22F896-40B5-4ADD-8801-0D06FADFA095}" type="slidenum">
               <a:rPr lang="en-US" dirty="0"/>
-              <a:t>‹#›</a:t>
+              <a:t>‹nr.›</a:t>
             </a:fld>
             <a:endParaRPr lang="en-US" dirty="0"/>
           </a:p>
@@ -3260,7 +3271,7 @@
             <a:fld id="{48A87A34-81AB-432B-8DAE-1953F412C126}" type="datetimeFigureOut">
               <a:rPr lang="en-US" dirty="0"/>
               <a:pPr/>
-              <a:t>20/01/16</a:t>
+              <a:t>1/20/2016</a:t>
             </a:fld>
             <a:endParaRPr lang="en-US" dirty="0"/>
           </a:p>
@@ -3312,7 +3323,7 @@
           <a:p>
             <a:fld id="{6D22F896-40B5-4ADD-8801-0D06FADFA095}" type="slidenum">
               <a:rPr lang="en-US" dirty="0"/>
-              <a:t>‹#›</a:t>
+              <a:t>‹nr.›</a:t>
             </a:fld>
             <a:endParaRPr lang="en-US" dirty="0"/>
           </a:p>
@@ -3435,7 +3446,7 @@
           <a:p>
             <a:fld id="{48A87A34-81AB-432B-8DAE-1953F412C126}" type="datetimeFigureOut">
               <a:rPr lang="en-US" dirty="0"/>
-              <a:t>20/01/16</a:t>
+              <a:t>1/20/2016</a:t>
             </a:fld>
             <a:endParaRPr lang="en-US" dirty="0"/>
           </a:p>
@@ -3477,7 +3488,7 @@
           <a:p>
             <a:fld id="{6D22F896-40B5-4ADD-8801-0D06FADFA095}" type="slidenum">
               <a:rPr lang="en-US" dirty="0"/>
-              <a:t>‹#›</a:t>
+              <a:t>‹nr.›</a:t>
             </a:fld>
             <a:endParaRPr lang="en-US" dirty="0"/>
           </a:p>
@@ -3720,7 +3731,7 @@
             <a:fld id="{48A87A34-81AB-432B-8DAE-1953F412C126}" type="datetimeFigureOut">
               <a:rPr lang="en-US" dirty="0"/>
               <a:pPr/>
-              <a:t>20/01/16</a:t>
+              <a:t>1/20/2016</a:t>
             </a:fld>
             <a:endParaRPr lang="en-US" dirty="0"/>
           </a:p>
@@ -3772,7 +3783,7 @@
           <a:p>
             <a:fld id="{6D22F896-40B5-4ADD-8801-0D06FADFA095}" type="slidenum">
               <a:rPr lang="en-US" dirty="0"/>
-              <a:t>‹#›</a:t>
+              <a:t>‹nr.›</a:t>
             </a:fld>
             <a:endParaRPr lang="en-US" dirty="0"/>
           </a:p>
@@ -3957,7 +3968,7 @@
           <a:p>
             <a:fld id="{48A87A34-81AB-432B-8DAE-1953F412C126}" type="datetimeFigureOut">
               <a:rPr lang="en-US" dirty="0"/>
-              <a:t>20/01/16</a:t>
+              <a:t>1/20/2016</a:t>
             </a:fld>
             <a:endParaRPr lang="en-US" dirty="0"/>
           </a:p>
@@ -3999,7 +4010,7 @@
           <a:p>
             <a:fld id="{6D22F896-40B5-4ADD-8801-0D06FADFA095}" type="slidenum">
               <a:rPr lang="en-US" dirty="0"/>
-              <a:t>‹#›</a:t>
+              <a:t>‹nr.›</a:t>
             </a:fld>
             <a:endParaRPr lang="en-US" dirty="0"/>
           </a:p>
@@ -4331,7 +4342,7 @@
           <a:p>
             <a:fld id="{48A87A34-81AB-432B-8DAE-1953F412C126}" type="datetimeFigureOut">
               <a:rPr lang="en-US" dirty="0"/>
-              <a:t>20/01/16</a:t>
+              <a:t>1/20/2016</a:t>
             </a:fld>
             <a:endParaRPr lang="en-US" dirty="0"/>
           </a:p>
@@ -4373,7 +4384,7 @@
           <a:p>
             <a:fld id="{6D22F896-40B5-4ADD-8801-0D06FADFA095}" type="slidenum">
               <a:rPr lang="en-US" dirty="0"/>
-              <a:t>‹#›</a:t>
+              <a:t>‹nr.›</a:t>
             </a:fld>
             <a:endParaRPr lang="en-US" dirty="0"/>
           </a:p>
@@ -4444,7 +4455,7 @@
           <a:p>
             <a:fld id="{48A87A34-81AB-432B-8DAE-1953F412C126}" type="datetimeFigureOut">
               <a:rPr lang="en-US" dirty="0"/>
-              <a:t>20/01/16</a:t>
+              <a:t>1/20/2016</a:t>
             </a:fld>
             <a:endParaRPr lang="en-US" dirty="0"/>
           </a:p>
@@ -4486,7 +4497,7 @@
           <a:p>
             <a:fld id="{6D22F896-40B5-4ADD-8801-0D06FADFA095}" type="slidenum">
               <a:rPr lang="en-US" dirty="0"/>
-              <a:t>‹#›</a:t>
+              <a:t>‹nr.›</a:t>
             </a:fld>
             <a:endParaRPr lang="en-US" dirty="0"/>
           </a:p>
@@ -4534,7 +4545,7 @@
           <a:p>
             <a:fld id="{48A87A34-81AB-432B-8DAE-1953F412C126}" type="datetimeFigureOut">
               <a:rPr lang="en-US" dirty="0"/>
-              <a:t>20/01/16</a:t>
+              <a:t>1/20/2016</a:t>
             </a:fld>
             <a:endParaRPr lang="en-US" dirty="0"/>
           </a:p>
@@ -4576,7 +4587,7 @@
           <a:p>
             <a:fld id="{6D22F896-40B5-4ADD-8801-0D06FADFA095}" type="slidenum">
               <a:rPr lang="en-US" dirty="0"/>
-              <a:t>‹#›</a:t>
+              <a:t>‹nr.›</a:t>
             </a:fld>
             <a:endParaRPr lang="en-US" dirty="0"/>
           </a:p>
@@ -4778,7 +4789,7 @@
           <a:p>
             <a:fld id="{48A87A34-81AB-432B-8DAE-1953F412C126}" type="datetimeFigureOut">
               <a:rPr lang="en-US" dirty="0"/>
-              <a:t>20/01/16</a:t>
+              <a:t>1/20/2016</a:t>
             </a:fld>
             <a:endParaRPr lang="en-US" dirty="0"/>
           </a:p>
@@ -4820,7 +4831,7 @@
           <a:p>
             <a:fld id="{6D22F896-40B5-4ADD-8801-0D06FADFA095}" type="slidenum">
               <a:rPr lang="en-US" dirty="0"/>
-              <a:t>‹#›</a:t>
+              <a:t>‹nr.›</a:t>
             </a:fld>
             <a:endParaRPr lang="en-US" dirty="0"/>
           </a:p>
@@ -5030,7 +5041,7 @@
           <a:p>
             <a:fld id="{48A87A34-81AB-432B-8DAE-1953F412C126}" type="datetimeFigureOut">
               <a:rPr lang="en-US" dirty="0"/>
-              <a:t>20/01/16</a:t>
+              <a:t>1/20/2016</a:t>
             </a:fld>
             <a:endParaRPr lang="en-US" dirty="0"/>
           </a:p>
@@ -5072,7 +5083,7 @@
           <a:p>
             <a:fld id="{6D22F896-40B5-4ADD-8801-0D06FADFA095}" type="slidenum">
               <a:rPr lang="en-US" dirty="0"/>
-              <a:t>‹#›</a:t>
+              <a:t>‹nr.›</a:t>
             </a:fld>
             <a:endParaRPr lang="en-US" dirty="0"/>
           </a:p>
@@ -5269,7 +5280,7 @@
             <a:fld id="{48A87A34-81AB-432B-8DAE-1953F412C126}" type="datetimeFigureOut">
               <a:rPr lang="en-US" dirty="0"/>
               <a:pPr/>
-              <a:t>20/01/16</a:t>
+              <a:t>1/20/2016</a:t>
             </a:fld>
             <a:endParaRPr lang="en-US" dirty="0"/>
           </a:p>
@@ -5348,7 +5359,7 @@
             <a:fld id="{6D22F896-40B5-4ADD-8801-0D06FADFA095}" type="slidenum">
               <a:rPr lang="en-US" dirty="0"/>
               <a:pPr/>
-              <a:t>‹#›</a:t>
+              <a:t>‹nr.›</a:t>
             </a:fld>
             <a:endParaRPr lang="en-US" dirty="0"/>
           </a:p>
@@ -6392,7 +6403,6 @@
               <a:rPr lang="da-DK" dirty="0" smtClean="0"/>
               <a:t>Udvikling</a:t>
             </a:r>
-            <a:endParaRPr lang="da-DK" dirty="0" smtClean="0"/>
           </a:p>
           <a:p>
             <a:r>
@@ -6788,70 +6798,81 @@
         </p:nvSpPr>
         <p:spPr/>
         <p:txBody>
-          <a:bodyPr>
-            <a:normAutofit lnSpcReduction="10000"/>
-          </a:bodyPr>
-          <a:lstStyle/>
+          <a:bodyPr/>
+          <a:lstStyle/>
+          <a:p>
+            <a:r>
+              <a:rPr lang="da-DK" dirty="0" smtClean="0"/>
+              <a:t>Operationsforstærker kontra </a:t>
+            </a:r>
+            <a:r>
+              <a:rPr lang="da-DK" dirty="0" err="1" smtClean="0"/>
+              <a:t>instrimentationsforstærker</a:t>
+            </a:r>
+            <a:r>
+              <a:rPr lang="da-DK" dirty="0" smtClean="0"/>
+              <a:t>.</a:t>
+            </a:r>
+          </a:p>
+          <a:p>
+            <a:pPr lvl="1"/>
+            <a:r>
+              <a:rPr lang="da-DK" dirty="0"/>
+              <a:t>Indgangsimpedans</a:t>
+            </a:r>
+          </a:p>
+          <a:p>
+            <a:pPr lvl="1"/>
+            <a:r>
+              <a:rPr lang="da-DK" dirty="0"/>
+              <a:t>Common mode </a:t>
+            </a:r>
+            <a:r>
+              <a:rPr lang="da-DK" dirty="0" err="1" smtClean="0"/>
+              <a:t>rejection</a:t>
+            </a:r>
+            <a:endParaRPr lang="da-DK" dirty="0"/>
+          </a:p>
           <a:p>
             <a:endParaRPr lang="da-DK" dirty="0" smtClean="0"/>
           </a:p>
           <a:p>
+            <a:r>
+              <a:rPr lang="da-DK" dirty="0" smtClean="0"/>
+              <a:t>Dynamikområde</a:t>
+            </a:r>
+          </a:p>
+          <a:p>
             <a:endParaRPr lang="da-DK" dirty="0"/>
           </a:p>
           <a:p>
             <a:r>
+              <a:rPr lang="da-DK" dirty="0" err="1" smtClean="0"/>
+              <a:t>Analogdiscovery</a:t>
+            </a:r>
+            <a:r>
               <a:rPr lang="da-DK" dirty="0" smtClean="0"/>
-              <a:t>En forstærker og et filter</a:t>
-            </a:r>
-          </a:p>
-          <a:p>
-            <a:r>
-              <a:rPr lang="da-DK" dirty="0" smtClean="0"/>
-              <a:t>Teoretisk udvikling før fysisk. </a:t>
-            </a:r>
-          </a:p>
-          <a:p>
-            <a:r>
-              <a:rPr lang="da-DK" dirty="0" smtClean="0"/>
-              <a:t>Små spændinger – og de problemer de medfører!</a:t>
-            </a:r>
-          </a:p>
-          <a:p>
-            <a:r>
-              <a:rPr lang="da-DK" dirty="0" smtClean="0"/>
-              <a:t>Analog </a:t>
-            </a:r>
-            <a:r>
-              <a:rPr lang="da-DK" dirty="0" err="1" smtClean="0"/>
-              <a:t>Discovery</a:t>
-            </a:r>
-            <a:r>
-              <a:rPr lang="da-DK" dirty="0" smtClean="0"/>
-              <a:t> – Det lille bæst</a:t>
-            </a:r>
-          </a:p>
-          <a:p>
+              <a:t> frem for batteri</a:t>
+            </a:r>
+          </a:p>
+          <a:p>
+            <a:pPr lvl="1"/>
+            <a:r>
+              <a:rPr lang="da-DK" smtClean="0"/>
+              <a:t>Stabilitet </a:t>
+            </a:r>
             <a:endParaRPr lang="da-DK" dirty="0" smtClean="0"/>
           </a:p>
           <a:p>
+            <a:endParaRPr lang="da-DK" dirty="0"/>
+          </a:p>
+          <a:p>
             <a:endParaRPr lang="da-DK" dirty="0" smtClean="0"/>
           </a:p>
           <a:p>
             <a:endParaRPr lang="da-DK" dirty="0"/>
           </a:p>
           <a:p>
-            <a:r>
-              <a:rPr lang="da-DK" dirty="0" smtClean="0"/>
-              <a:t>Sara</a:t>
-            </a:r>
-            <a:r>
-              <a:rPr lang="da-DK" dirty="0"/>
-              <a:t> </a:t>
-            </a:r>
-            <a:r>
-              <a:rPr lang="da-DK" dirty="0" smtClean="0"/>
-              <a:t>– 3 minutter</a:t>
-            </a:r>
             <a:endParaRPr lang="da-DK" dirty="0"/>
           </a:p>
         </p:txBody>
@@ -6859,7 +6880,7 @@
     </p:spTree>
     <p:extLst>
       <p:ext uri="{BB962C8B-B14F-4D97-AF65-F5344CB8AC3E}">
-        <p14:creationId xmlns:p14="http://schemas.microsoft.com/office/powerpoint/2010/main" val="638884148"/>
+        <p14:creationId xmlns:p14="http://schemas.microsoft.com/office/powerpoint/2010/main" val="1977555632"/>
       </p:ext>
     </p:extLst>
   </p:cSld>
@@ -6919,91 +6940,306 @@
             <p:ph idx="1"/>
           </p:nvPr>
         </p:nvSpPr>
-        <p:spPr/>
-        <p:txBody>
-          <a:bodyPr/>
+        <p:spPr>
+          <a:xfrm>
+            <a:off x="685800" y="2194560"/>
+            <a:ext cx="4983480" cy="4024125"/>
+          </a:xfrm>
+        </p:spPr>
+        <p:txBody>
+          <a:bodyPr>
+            <a:normAutofit/>
+          </a:bodyPr>
           <a:lstStyle/>
           <a:p>
             <a:r>
               <a:rPr lang="da-DK" dirty="0" smtClean="0"/>
-              <a:t>Operationsforstærker kontra </a:t>
-            </a:r>
-            <a:r>
-              <a:rPr lang="da-DK" dirty="0" err="1" smtClean="0"/>
-              <a:t>instrimentationsforstærker</a:t>
-            </a:r>
+              <a:t>Forstærker</a:t>
+            </a:r>
+          </a:p>
+          <a:p>
+            <a:endParaRPr lang="da-DK" dirty="0"/>
+          </a:p>
+          <a:p>
+            <a:endParaRPr lang="da-DK" dirty="0" smtClean="0"/>
+          </a:p>
+          <a:p>
+            <a:endParaRPr lang="da-DK" dirty="0" smtClean="0"/>
+          </a:p>
+          <a:p>
+            <a:pPr marL="0" indent="0">
+              <a:buNone/>
+            </a:pPr>
+            <a:endParaRPr lang="da-DK" dirty="0"/>
+          </a:p>
+        </p:txBody>
+      </p:sp>
+      <p:pic>
+        <p:nvPicPr>
+          <p:cNvPr id="4" name="Billede 3"/>
+          <p:cNvPicPr>
+            <a:picLocks noChangeAspect="1"/>
+          </p:cNvPicPr>
+          <p:nvPr/>
+        </p:nvPicPr>
+        <p:blipFill>
+          <a:blip r:embed="rId2"/>
+          <a:stretch>
+            <a:fillRect/>
+          </a:stretch>
+        </p:blipFill>
+        <p:spPr>
+          <a:xfrm>
+            <a:off x="5911215" y="2050544"/>
+            <a:ext cx="4970145" cy="2407156"/>
+          </a:xfrm>
+          <a:prstGeom prst="rect">
+            <a:avLst/>
+          </a:prstGeom>
+        </p:spPr>
+      </p:pic>
+      <p:sp>
+        <p:nvSpPr>
+          <p:cNvPr id="5" name="Pladsholder til indhold 2"/>
+          <p:cNvSpPr txBox="1">
+            <a:spLocks/>
+          </p:cNvSpPr>
+          <p:nvPr/>
+        </p:nvSpPr>
+        <p:spPr>
+          <a:xfrm>
+            <a:off x="6149340" y="2194561"/>
+            <a:ext cx="5692140" cy="4024124"/>
+          </a:xfrm>
+          <a:prstGeom prst="rect">
+            <a:avLst/>
+          </a:prstGeom>
+        </p:spPr>
+        <p:txBody>
+          <a:bodyPr vert="horz" lIns="91440" tIns="45720" rIns="91440" bIns="45720" rtlCol="0">
+            <a:normAutofit/>
+          </a:bodyPr>
+          <a:lstStyle>
+            <a:lvl1pPr marL="228600" indent="-228600" algn="l" defTabSz="914400" rtl="0" eaLnBrk="1" latinLnBrk="0" hangingPunct="1">
+              <a:lnSpc>
+                <a:spcPct val="90000"/>
+              </a:lnSpc>
+              <a:spcBef>
+                <a:spcPts val="1000"/>
+              </a:spcBef>
+              <a:buFont typeface="Arial" panose="020B0604020202020204" pitchFamily="34" charset="0"/>
+              <a:buChar char="•"/>
+              <a:defRPr sz="2200" kern="1200">
+                <a:solidFill>
+                  <a:schemeClr val="tx1"/>
+                </a:solidFill>
+                <a:latin typeface="+mn-lt"/>
+                <a:ea typeface="+mn-ea"/>
+                <a:cs typeface="+mn-cs"/>
+              </a:defRPr>
+            </a:lvl1pPr>
+            <a:lvl2pPr marL="685800" indent="-228600" algn="l" defTabSz="914400" rtl="0" eaLnBrk="1" latinLnBrk="0" hangingPunct="1">
+              <a:lnSpc>
+                <a:spcPct val="90000"/>
+              </a:lnSpc>
+              <a:spcBef>
+                <a:spcPts val="500"/>
+              </a:spcBef>
+              <a:buFont typeface="Arial" panose="020B0604020202020204" pitchFamily="34" charset="0"/>
+              <a:buChar char="•"/>
+              <a:defRPr sz="2000" kern="1200">
+                <a:solidFill>
+                  <a:schemeClr val="tx1"/>
+                </a:solidFill>
+                <a:latin typeface="+mn-lt"/>
+                <a:ea typeface="+mn-ea"/>
+                <a:cs typeface="+mn-cs"/>
+              </a:defRPr>
+            </a:lvl2pPr>
+            <a:lvl3pPr marL="1143000" indent="-228600" algn="l" defTabSz="914400" rtl="0" eaLnBrk="1" latinLnBrk="0" hangingPunct="1">
+              <a:lnSpc>
+                <a:spcPct val="90000"/>
+              </a:lnSpc>
+              <a:spcBef>
+                <a:spcPts val="500"/>
+              </a:spcBef>
+              <a:buFont typeface="Arial" panose="020B0604020202020204" pitchFamily="34" charset="0"/>
+              <a:buChar char="•"/>
+              <a:defRPr sz="1800" kern="1200">
+                <a:solidFill>
+                  <a:schemeClr val="tx1"/>
+                </a:solidFill>
+                <a:latin typeface="+mn-lt"/>
+                <a:ea typeface="+mn-ea"/>
+                <a:cs typeface="+mn-cs"/>
+              </a:defRPr>
+            </a:lvl3pPr>
+            <a:lvl4pPr marL="1600200" indent="-228600" algn="l" defTabSz="914400" rtl="0" eaLnBrk="1" latinLnBrk="0" hangingPunct="1">
+              <a:lnSpc>
+                <a:spcPct val="90000"/>
+              </a:lnSpc>
+              <a:spcBef>
+                <a:spcPts val="500"/>
+              </a:spcBef>
+              <a:buFont typeface="Arial" panose="020B0604020202020204" pitchFamily="34" charset="0"/>
+              <a:buChar char="•"/>
+              <a:defRPr sz="1600" kern="1200">
+                <a:solidFill>
+                  <a:schemeClr val="tx1"/>
+                </a:solidFill>
+                <a:latin typeface="+mn-lt"/>
+                <a:ea typeface="+mn-ea"/>
+                <a:cs typeface="+mn-cs"/>
+              </a:defRPr>
+            </a:lvl4pPr>
+            <a:lvl5pPr marL="2057400" indent="-228600" algn="l" defTabSz="914400" rtl="0" eaLnBrk="1" latinLnBrk="0" hangingPunct="1">
+              <a:lnSpc>
+                <a:spcPct val="90000"/>
+              </a:lnSpc>
+              <a:spcBef>
+                <a:spcPts val="500"/>
+              </a:spcBef>
+              <a:buFont typeface="Arial" panose="020B0604020202020204" pitchFamily="34" charset="0"/>
+              <a:buChar char="•"/>
+              <a:defRPr sz="1600" kern="1200">
+                <a:solidFill>
+                  <a:schemeClr val="tx1"/>
+                </a:solidFill>
+                <a:latin typeface="+mn-lt"/>
+                <a:ea typeface="+mn-ea"/>
+                <a:cs typeface="+mn-cs"/>
+              </a:defRPr>
+            </a:lvl5pPr>
+            <a:lvl6pPr marL="2514600" indent="-228600" algn="l" defTabSz="914400" rtl="0" eaLnBrk="1" latinLnBrk="0" hangingPunct="1">
+              <a:lnSpc>
+                <a:spcPct val="90000"/>
+              </a:lnSpc>
+              <a:spcBef>
+                <a:spcPts val="500"/>
+              </a:spcBef>
+              <a:buFont typeface="Arial" panose="020B0604020202020204" pitchFamily="34" charset="0"/>
+              <a:buChar char="•"/>
+              <a:defRPr sz="1600" kern="1200">
+                <a:solidFill>
+                  <a:schemeClr val="tx1"/>
+                </a:solidFill>
+                <a:latin typeface="+mn-lt"/>
+                <a:ea typeface="+mn-ea"/>
+                <a:cs typeface="+mn-cs"/>
+              </a:defRPr>
+            </a:lvl6pPr>
+            <a:lvl7pPr marL="2971800" indent="-228600" algn="l" defTabSz="914400" rtl="0" eaLnBrk="1" latinLnBrk="0" hangingPunct="1">
+              <a:lnSpc>
+                <a:spcPct val="90000"/>
+              </a:lnSpc>
+              <a:spcBef>
+                <a:spcPts val="500"/>
+              </a:spcBef>
+              <a:buFont typeface="Arial" panose="020B0604020202020204" pitchFamily="34" charset="0"/>
+              <a:buChar char="•"/>
+              <a:defRPr sz="1600" kern="1200">
+                <a:solidFill>
+                  <a:schemeClr val="tx1"/>
+                </a:solidFill>
+                <a:latin typeface="+mn-lt"/>
+                <a:ea typeface="+mn-ea"/>
+                <a:cs typeface="+mn-cs"/>
+              </a:defRPr>
+            </a:lvl7pPr>
+            <a:lvl8pPr marL="3429000" indent="-228600" algn="l" defTabSz="914400" rtl="0" eaLnBrk="1" latinLnBrk="0" hangingPunct="1">
+              <a:lnSpc>
+                <a:spcPct val="90000"/>
+              </a:lnSpc>
+              <a:spcBef>
+                <a:spcPts val="500"/>
+              </a:spcBef>
+              <a:buFont typeface="Arial" panose="020B0604020202020204" pitchFamily="34" charset="0"/>
+              <a:buChar char="•"/>
+              <a:defRPr sz="1600" kern="1200">
+                <a:solidFill>
+                  <a:schemeClr val="tx1"/>
+                </a:solidFill>
+                <a:latin typeface="+mn-lt"/>
+                <a:ea typeface="+mn-ea"/>
+                <a:cs typeface="+mn-cs"/>
+              </a:defRPr>
+            </a:lvl8pPr>
+            <a:lvl9pPr marL="3886200" indent="-228600" algn="l" defTabSz="914400" rtl="0" eaLnBrk="1" latinLnBrk="0" hangingPunct="1">
+              <a:lnSpc>
+                <a:spcPct val="90000"/>
+              </a:lnSpc>
+              <a:spcBef>
+                <a:spcPts val="500"/>
+              </a:spcBef>
+              <a:buFont typeface="Arial" panose="020B0604020202020204" pitchFamily="34" charset="0"/>
+              <a:buChar char="•"/>
+              <a:defRPr sz="1600" kern="1200">
+                <a:solidFill>
+                  <a:schemeClr val="tx1"/>
+                </a:solidFill>
+                <a:latin typeface="+mn-lt"/>
+                <a:ea typeface="+mn-ea"/>
+                <a:cs typeface="+mn-cs"/>
+              </a:defRPr>
+            </a:lvl9pPr>
+          </a:lstStyle>
+          <a:p>
+            <a:pPr marL="0" indent="0">
+              <a:buNone/>
+            </a:pPr>
+            <a:endParaRPr lang="da-DK" dirty="0" smtClean="0"/>
+          </a:p>
+          <a:p>
+            <a:endParaRPr lang="da-DK" dirty="0" smtClean="0"/>
+          </a:p>
+          <a:p>
+            <a:endParaRPr lang="da-DK" dirty="0" smtClean="0"/>
+          </a:p>
+          <a:p>
+            <a:endParaRPr lang="da-DK" dirty="0" smtClean="0"/>
+          </a:p>
+          <a:p>
+            <a:endParaRPr lang="da-DK" dirty="0" smtClean="0"/>
+          </a:p>
+          <a:p>
+            <a:endParaRPr lang="da-DK" dirty="0" smtClean="0"/>
+          </a:p>
+          <a:p>
             <a:r>
               <a:rPr lang="da-DK" dirty="0" smtClean="0"/>
-              <a:t>.</a:t>
-            </a:r>
-          </a:p>
-          <a:p>
-            <a:pPr lvl="1"/>
-            <a:r>
-              <a:rPr lang="da-DK" dirty="0"/>
-              <a:t>Indgangsimpedans</a:t>
-            </a:r>
-          </a:p>
-          <a:p>
-            <a:pPr lvl="1"/>
-            <a:r>
-              <a:rPr lang="da-DK" dirty="0"/>
-              <a:t>Common mode </a:t>
-            </a:r>
-            <a:r>
-              <a:rPr lang="da-DK" dirty="0" err="1" smtClean="0"/>
-              <a:t>rejection</a:t>
-            </a:r>
-            <a:endParaRPr lang="da-DK" dirty="0"/>
-          </a:p>
-          <a:p>
-            <a:endParaRPr lang="da-DK" dirty="0" smtClean="0"/>
-          </a:p>
-          <a:p>
-            <a:r>
-              <a:rPr lang="da-DK" dirty="0" smtClean="0"/>
-              <a:t>Dynamikområde</a:t>
-            </a:r>
-          </a:p>
-          <a:p>
-            <a:endParaRPr lang="da-DK" dirty="0"/>
-          </a:p>
-          <a:p>
-            <a:r>
-              <a:rPr lang="da-DK" dirty="0" err="1" smtClean="0"/>
-              <a:t>Analogdiscovery</a:t>
-            </a:r>
-            <a:r>
-              <a:rPr lang="da-DK" dirty="0" smtClean="0"/>
-              <a:t> frem for batteri</a:t>
-            </a:r>
-          </a:p>
-          <a:p>
-            <a:pPr lvl="1"/>
-            <a:r>
-              <a:rPr lang="da-DK" smtClean="0"/>
-              <a:t>Stabilitet </a:t>
-            </a:r>
-            <a:endParaRPr lang="da-DK" dirty="0" smtClean="0"/>
-          </a:p>
-          <a:p>
-            <a:endParaRPr lang="da-DK" dirty="0"/>
-          </a:p>
-          <a:p>
-            <a:endParaRPr lang="da-DK" dirty="0" smtClean="0"/>
-          </a:p>
-          <a:p>
-            <a:endParaRPr lang="da-DK" dirty="0"/>
-          </a:p>
-          <a:p>
-            <a:endParaRPr lang="da-DK" dirty="0"/>
-          </a:p>
-        </p:txBody>
-      </p:sp>
+              <a:t>Filter</a:t>
+            </a:r>
+          </a:p>
+        </p:txBody>
+      </p:sp>
+      <p:pic>
+        <p:nvPicPr>
+          <p:cNvPr id="6" name="Billede 5"/>
+          <p:cNvPicPr>
+            <a:picLocks noChangeAspect="1"/>
+          </p:cNvPicPr>
+          <p:nvPr/>
+        </p:nvPicPr>
+        <p:blipFill>
+          <a:blip r:embed="rId3"/>
+          <a:stretch>
+            <a:fillRect/>
+          </a:stretch>
+        </p:blipFill>
+        <p:spPr>
+          <a:xfrm>
+            <a:off x="443865" y="4155569"/>
+            <a:ext cx="4857750" cy="2200275"/>
+          </a:xfrm>
+          <a:prstGeom prst="rect">
+            <a:avLst/>
+          </a:prstGeom>
+        </p:spPr>
+      </p:pic>
     </p:spTree>
     <p:extLst>
       <p:ext uri="{BB962C8B-B14F-4D97-AF65-F5344CB8AC3E}">
-        <p14:creationId xmlns:p14="http://schemas.microsoft.com/office/powerpoint/2010/main" val="1977555632"/>
+        <p14:creationId xmlns:p14="http://schemas.microsoft.com/office/powerpoint/2010/main" val="1490474087"/>
       </p:ext>
     </p:extLst>
   </p:cSld>
@@ -7465,7 +7701,7 @@
   <a:extraClrSchemeLst/>
   <a:extLst>
     <a:ext uri="{05A4C25C-085E-4340-85A3-A5531E510DB2}">
-      <thm15:themeFamily xmlns="" xmlns:thm15="http://schemas.microsoft.com/office/thememl/2012/main" name="Vapor Trail" id="{4FDF2955-7D9C-493C-B9F9-C205151B46CD}" vid="{8F31A783-2159-4870-BC29-2BA7D038EA44}"/>
+      <thm15:themeFamily xmlns:thm15="http://schemas.microsoft.com/office/thememl/2012/main" name="Vapor Trail" id="{4FDF2955-7D9C-493C-B9F9-C205151B46CD}" vid="{8F31A783-2159-4870-BC29-2BA7D038EA44}"/>
     </a:ext>
   </a:extLst>
 </a:theme>

</xml_diff>